<commit_message>
Closing up for the night
</commit_message>
<xml_diff>
--- a/figs/PresentationPlots_Draft_Stiling.pptx
+++ b/figs/PresentationPlots_Draft_Stiling.pptx
@@ -3105,11 +3105,7 @@
           <a:p>
             <a:r>
               <a:rPr lang="en-US" dirty="0" smtClean="0"/>
-              <a:t>For this plot, I added margin to the top and bottom of the second plot, to try to get the tick marks aligned. But now the horizontal x-axis of each plot are not on the same plane and y-axis are not the same </a:t>
-            </a:r>
-            <a:r>
-              <a:rPr lang="en-US" dirty="0" smtClean="0"/>
-              <a:t>length</a:t>
+              <a:t>For this plot, I added margin to the top and bottom of the second plot, to try to get the tick marks aligned. But now the horizontal x-axis of each plot are not on the same plane and y-axis are not the same length</a:t>
             </a:r>
             <a:r>
               <a:rPr lang="en-US" smtClean="0"/>

</xml_diff>